<commit_message>
update for midterm review
</commit_message>
<xml_diff>
--- a/resources/06_RandomGraphs.pptx
+++ b/resources/06_RandomGraphs.pptx
@@ -5,7 +5,7 @@
     <p:sldMasterId id="2147483722" r:id="rId1"/>
   </p:sldMasterIdLst>
   <p:notesMasterIdLst>
-    <p:notesMasterId r:id="rId29"/>
+    <p:notesMasterId r:id="rId32"/>
   </p:notesMasterIdLst>
   <p:sldIdLst>
     <p:sldId id="256" r:id="rId2"/>
@@ -32,9 +32,12 @@
     <p:sldId id="379" r:id="rId23"/>
     <p:sldId id="381" r:id="rId24"/>
     <p:sldId id="382" r:id="rId25"/>
-    <p:sldId id="383" r:id="rId26"/>
-    <p:sldId id="384" r:id="rId27"/>
-    <p:sldId id="325" r:id="rId28"/>
+    <p:sldId id="386" r:id="rId26"/>
+    <p:sldId id="387" r:id="rId27"/>
+    <p:sldId id="388" r:id="rId28"/>
+    <p:sldId id="383" r:id="rId29"/>
+    <p:sldId id="384" r:id="rId30"/>
+    <p:sldId id="325" r:id="rId31"/>
   </p:sldIdLst>
   <p:sldSz cx="9144000" cy="6858000" type="screen4x3"/>
   <p:notesSz cx="7772400" cy="10058400"/>
@@ -150,7 +153,7 @@
           <c:yMode val="edge"/>
           <c:x val="0.17681692913385827"/>
           <c:y val="9.0960557013706644E-2"/>
-          <c:w val="0.79262751531058695"/>
+          <c:w val="0.79262751531058728"/>
           <c:h val="0.64256197142023919"/>
         </c:manualLayout>
       </c:layout>
@@ -201,11 +204,11 @@
             </c:numRef>
           </c:val>
         </c:ser>
-        <c:axId val="76728576"/>
-        <c:axId val="76787712"/>
+        <c:axId val="84563840"/>
+        <c:axId val="84565376"/>
       </c:barChart>
       <c:catAx>
-        <c:axId val="76728576"/>
+        <c:axId val="84563840"/>
         <c:scaling>
           <c:orientation val="minMax"/>
         </c:scaling>
@@ -221,14 +224,14 @@
             <a:endParaRPr lang="en-US"/>
           </a:p>
         </c:txPr>
-        <c:crossAx val="76787712"/>
+        <c:crossAx val="84565376"/>
         <c:crosses val="autoZero"/>
         <c:auto val="1"/>
         <c:lblAlgn val="ctr"/>
         <c:lblOffset val="100"/>
       </c:catAx>
       <c:valAx>
-        <c:axId val="76787712"/>
+        <c:axId val="84565376"/>
         <c:scaling>
           <c:orientation val="minMax"/>
         </c:scaling>
@@ -246,7 +249,7 @@
             <a:endParaRPr lang="en-US"/>
           </a:p>
         </c:txPr>
-        <c:crossAx val="76728576"/>
+        <c:crossAx val="84563840"/>
         <c:crosses val="autoZero"/>
         <c:crossBetween val="between"/>
       </c:valAx>
@@ -303,20 +306,20 @@
                 <c:formatCode>General</c:formatCode>
                 <c:ptCount val="2"/>
                 <c:pt idx="0">
-                  <c:v>0.30000000000000016</c:v>
+                  <c:v>0.30000000000000027</c:v>
                 </c:pt>
                 <c:pt idx="1">
-                  <c:v>0.70000000000000029</c:v>
+                  <c:v>0.70000000000000051</c:v>
                 </c:pt>
               </c:numCache>
             </c:numRef>
           </c:val>
         </c:ser>
-        <c:axId val="76794496"/>
-        <c:axId val="47055232"/>
+        <c:axId val="47073536"/>
+        <c:axId val="47079424"/>
       </c:barChart>
       <c:catAx>
-        <c:axId val="76794496"/>
+        <c:axId val="47073536"/>
         <c:scaling>
           <c:orientation val="minMax"/>
         </c:scaling>
@@ -332,14 +335,14 @@
             <a:endParaRPr lang="en-US"/>
           </a:p>
         </c:txPr>
-        <c:crossAx val="47055232"/>
+        <c:crossAx val="47079424"/>
         <c:crosses val="autoZero"/>
         <c:auto val="1"/>
         <c:lblAlgn val="ctr"/>
         <c:lblOffset val="100"/>
       </c:catAx>
       <c:valAx>
-        <c:axId val="47055232"/>
+        <c:axId val="47079424"/>
         <c:scaling>
           <c:orientation val="minMax"/>
         </c:scaling>
@@ -357,7 +360,7 @@
             <a:endParaRPr lang="en-US"/>
           </a:p>
         </c:txPr>
-        <c:crossAx val="76794496"/>
+        <c:crossAx val="47073536"/>
         <c:crosses val="autoZero"/>
         <c:crossBetween val="between"/>
       </c:valAx>
@@ -436,11 +439,11 @@
             </c:numRef>
           </c:val>
         </c:ser>
-        <c:axId val="47066112"/>
-        <c:axId val="47072000"/>
+        <c:axId val="47098496"/>
+        <c:axId val="47108480"/>
       </c:barChart>
       <c:catAx>
-        <c:axId val="47066112"/>
+        <c:axId val="47098496"/>
         <c:scaling>
           <c:orientation val="minMax"/>
         </c:scaling>
@@ -457,14 +460,14 @@
             <a:endParaRPr lang="en-US"/>
           </a:p>
         </c:txPr>
-        <c:crossAx val="47072000"/>
+        <c:crossAx val="47108480"/>
         <c:crosses val="autoZero"/>
         <c:auto val="1"/>
         <c:lblAlgn val="ctr"/>
         <c:lblOffset val="100"/>
       </c:catAx>
       <c:valAx>
-        <c:axId val="47072000"/>
+        <c:axId val="47108480"/>
         <c:scaling>
           <c:orientation val="minMax"/>
           <c:max val="1.1000000000000001"/>
@@ -484,7 +487,7 @@
             <a:endParaRPr lang="en-US"/>
           </a:p>
         </c:txPr>
-        <c:crossAx val="47066112"/>
+        <c:crossAx val="47098496"/>
         <c:crosses val="autoZero"/>
         <c:crossBetween val="between"/>
         <c:majorUnit val="0.5"/>
@@ -564,11 +567,11 @@
             </c:numRef>
           </c:val>
         </c:ser>
-        <c:axId val="47082880"/>
-        <c:axId val="47092864"/>
+        <c:axId val="47119360"/>
+        <c:axId val="85070592"/>
       </c:barChart>
       <c:catAx>
-        <c:axId val="47082880"/>
+        <c:axId val="47119360"/>
         <c:scaling>
           <c:orientation val="minMax"/>
         </c:scaling>
@@ -585,14 +588,14 @@
             <a:endParaRPr lang="en-US"/>
           </a:p>
         </c:txPr>
-        <c:crossAx val="47092864"/>
+        <c:crossAx val="85070592"/>
         <c:crosses val="autoZero"/>
         <c:auto val="1"/>
         <c:lblAlgn val="ctr"/>
         <c:lblOffset val="100"/>
       </c:catAx>
       <c:valAx>
-        <c:axId val="47092864"/>
+        <c:axId val="85070592"/>
         <c:scaling>
           <c:orientation val="minMax"/>
           <c:max val="1"/>
@@ -612,10 +615,10 @@
             <a:endParaRPr lang="en-US"/>
           </a:p>
         </c:txPr>
-        <c:crossAx val="47082880"/>
+        <c:crossAx val="47119360"/>
         <c:crosses val="autoZero"/>
         <c:crossBetween val="between"/>
-        <c:majorUnit val="0.33300000000000046"/>
+        <c:majorUnit val="0.33300000000000057"/>
       </c:valAx>
     </c:plotArea>
     <c:plotVisOnly val="1"/>
@@ -722,11 +725,11 @@
             </c:numRef>
           </c:val>
         </c:ser>
-        <c:axId val="77086080"/>
-        <c:axId val="77088256"/>
+        <c:axId val="85085184"/>
+        <c:axId val="85095552"/>
       </c:barChart>
       <c:catAx>
-        <c:axId val="77086080"/>
+        <c:axId val="85085184"/>
         <c:scaling>
           <c:orientation val="minMax"/>
         </c:scaling>
@@ -756,14 +759,14 @@
         </c:title>
         <c:numFmt formatCode="General" sourceLinked="1"/>
         <c:tickLblPos val="nextTo"/>
-        <c:crossAx val="77088256"/>
+        <c:crossAx val="85095552"/>
         <c:crosses val="autoZero"/>
         <c:auto val="1"/>
         <c:lblAlgn val="ctr"/>
         <c:lblOffset val="100"/>
       </c:catAx>
       <c:valAx>
-        <c:axId val="77088256"/>
+        <c:axId val="85095552"/>
         <c:scaling>
           <c:orientation val="minMax"/>
         </c:scaling>
@@ -771,7 +774,7 @@
         <c:majorGridlines/>
         <c:numFmt formatCode="General" sourceLinked="1"/>
         <c:tickLblPos val="nextTo"/>
-        <c:crossAx val="77086080"/>
+        <c:crossAx val="85085184"/>
         <c:crosses val="autoZero"/>
         <c:crossBetween val="between"/>
       </c:valAx>
@@ -865,7 +868,7 @@
             <a:fld id="{607AE066-929E-4C9D-ABCF-990BD1072CD3}" type="datetimeFigureOut">
               <a:rPr lang="en-US" smtClean="0"/>
               <a:pPr/>
-              <a:t>4/16/2018</a:t>
+              <a:t>4/18/2018</a:t>
             </a:fld>
             <a:endParaRPr lang="en-US"/>
           </a:p>
@@ -1641,7 +1644,7 @@
             <a:fld id="{7311ED5D-D581-45DD-8794-E9C46D49B82B}" type="slidenum">
               <a:rPr lang="en-US" smtClean="0"/>
               <a:pPr/>
-              <a:t>26</a:t>
+              <a:t>29</a:t>
             </a:fld>
             <a:endParaRPr lang="en-US"/>
           </a:p>
@@ -1843,7 +1846,7 @@
             <a:fld id="{53169529-68D7-4B27-AE22-45CE24A50B5C}" type="datetimeFigureOut">
               <a:rPr lang="en-US" smtClean="0"/>
               <a:pPr/>
-              <a:t>4/16/2018</a:t>
+              <a:t>4/18/2018</a:t>
             </a:fld>
             <a:endParaRPr lang="en-US"/>
           </a:p>
@@ -2124,7 +2127,7 @@
             <a:fld id="{53169529-68D7-4B27-AE22-45CE24A50B5C}" type="datetimeFigureOut">
               <a:rPr lang="en-US" smtClean="0"/>
               <a:pPr/>
-              <a:t>4/16/2018</a:t>
+              <a:t>4/18/2018</a:t>
             </a:fld>
             <a:endParaRPr lang="en-US"/>
           </a:p>
@@ -2374,7 +2377,7 @@
             <a:fld id="{53169529-68D7-4B27-AE22-45CE24A50B5C}" type="datetimeFigureOut">
               <a:rPr lang="en-US" smtClean="0"/>
               <a:pPr/>
-              <a:t>4/16/2018</a:t>
+              <a:t>4/18/2018</a:t>
             </a:fld>
             <a:endParaRPr lang="en-US"/>
           </a:p>
@@ -2541,7 +2544,7 @@
             <a:fld id="{53169529-68D7-4B27-AE22-45CE24A50B5C}" type="datetimeFigureOut">
               <a:rPr lang="en-US" smtClean="0"/>
               <a:pPr/>
-              <a:t>4/16/2018</a:t>
+              <a:t>4/18/2018</a:t>
             </a:fld>
             <a:endParaRPr lang="en-US"/>
           </a:p>
@@ -2718,7 +2721,7 @@
             <a:fld id="{53169529-68D7-4B27-AE22-45CE24A50B5C}" type="datetimeFigureOut">
               <a:rPr lang="en-US" smtClean="0"/>
               <a:pPr/>
-              <a:t>4/16/2018</a:t>
+              <a:t>4/18/2018</a:t>
             </a:fld>
             <a:endParaRPr lang="en-US"/>
           </a:p>
@@ -2832,7 +2835,7 @@
                   <a:spcPct val="100000"/>
                 </a:lnSpc>
               </a:pPr>
-              <a:t>4/16/2018</a:t>
+              <a:t>4/18/2018</a:t>
             </a:fld>
             <a:endParaRPr lang="en-US" sz="1200" b="0" strike="noStrike" spc="-1">
               <a:latin typeface="Times New Roman"/>
@@ -3187,7 +3190,7 @@
             <a:fld id="{53169529-68D7-4B27-AE22-45CE24A50B5C}" type="datetimeFigureOut">
               <a:rPr lang="en-US" smtClean="0"/>
               <a:pPr/>
-              <a:t>4/16/2018</a:t>
+              <a:t>4/18/2018</a:t>
             </a:fld>
             <a:endParaRPr lang="en-US"/>
           </a:p>
@@ -3377,7 +3380,7 @@
             <a:fld id="{53169529-68D7-4B27-AE22-45CE24A50B5C}" type="datetimeFigureOut">
               <a:rPr lang="en-US" smtClean="0"/>
               <a:pPr/>
-              <a:t>4/16/2018</a:t>
+              <a:t>4/18/2018</a:t>
             </a:fld>
             <a:endParaRPr lang="en-US"/>
           </a:p>
@@ -3627,7 +3630,7 @@
             <a:fld id="{53169529-68D7-4B27-AE22-45CE24A50B5C}" type="datetimeFigureOut">
               <a:rPr lang="en-US" smtClean="0"/>
               <a:pPr/>
-              <a:t>4/16/2018</a:t>
+              <a:t>4/18/2018</a:t>
             </a:fld>
             <a:endParaRPr lang="en-US"/>
           </a:p>
@@ -3884,7 +3887,7 @@
             <a:fld id="{53169529-68D7-4B27-AE22-45CE24A50B5C}" type="datetimeFigureOut">
               <a:rPr lang="en-US" smtClean="0"/>
               <a:pPr/>
-              <a:t>4/16/2018</a:t>
+              <a:t>4/18/2018</a:t>
             </a:fld>
             <a:endParaRPr lang="en-US"/>
           </a:p>
@@ -4176,7 +4179,7 @@
             <a:fld id="{53169529-68D7-4B27-AE22-45CE24A50B5C}" type="datetimeFigureOut">
               <a:rPr lang="en-US" smtClean="0"/>
               <a:pPr/>
-              <a:t>4/16/2018</a:t>
+              <a:t>4/18/2018</a:t>
             </a:fld>
             <a:endParaRPr lang="en-US"/>
           </a:p>
@@ -4602,7 +4605,7 @@
             <a:fld id="{53169529-68D7-4B27-AE22-45CE24A50B5C}" type="datetimeFigureOut">
               <a:rPr lang="en-US" smtClean="0"/>
               <a:pPr/>
-              <a:t>4/16/2018</a:t>
+              <a:t>4/18/2018</a:t>
             </a:fld>
             <a:endParaRPr lang="en-US"/>
           </a:p>
@@ -4724,7 +4727,7 @@
             <a:fld id="{53169529-68D7-4B27-AE22-45CE24A50B5C}" type="datetimeFigureOut">
               <a:rPr lang="en-US" smtClean="0"/>
               <a:pPr/>
-              <a:t>4/16/2018</a:t>
+              <a:t>4/18/2018</a:t>
             </a:fld>
             <a:endParaRPr lang="en-US"/>
           </a:p>
@@ -4823,7 +4826,7 @@
             <a:fld id="{53169529-68D7-4B27-AE22-45CE24A50B5C}" type="datetimeFigureOut">
               <a:rPr lang="en-US" smtClean="0"/>
               <a:pPr/>
-              <a:t>4/16/2018</a:t>
+              <a:t>4/18/2018</a:t>
             </a:fld>
             <a:endParaRPr lang="en-US"/>
           </a:p>
@@ -5033,7 +5036,7 @@
             <a:fld id="{53169529-68D7-4B27-AE22-45CE24A50B5C}" type="datetimeFigureOut">
               <a:rPr lang="en-US" smtClean="0"/>
               <a:pPr/>
-              <a:t>4/16/2018</a:t>
+              <a:t>4/18/2018</a:t>
             </a:fld>
             <a:endParaRPr lang="en-US"/>
           </a:p>
@@ -16068,6 +16071,1556 @@
       </p:grpSpPr>
       <p:sp>
         <p:nvSpPr>
+          <p:cNvPr id="2" name="Title 1"/>
+          <p:cNvSpPr>
+            <a:spLocks noGrp="1"/>
+          </p:cNvSpPr>
+          <p:nvPr>
+            <p:ph type="title"/>
+          </p:nvPr>
+        </p:nvSpPr>
+        <p:spPr/>
+        <p:txBody>
+          <a:bodyPr/>
+          <a:lstStyle/>
+          <a:p>
+            <a:r>
+              <a:rPr lang="en-US" dirty="0" smtClean="0"/>
+              <a:t>Modularity, revisited</a:t>
+            </a:r>
+            <a:endParaRPr lang="en-US" dirty="0"/>
+          </a:p>
+        </p:txBody>
+      </p:sp>
+      <p:sp>
+        <p:nvSpPr>
+          <p:cNvPr id="3" name="Content Placeholder 2"/>
+          <p:cNvSpPr>
+            <a:spLocks noGrp="1"/>
+          </p:cNvSpPr>
+          <p:nvPr>
+            <p:ph idx="1"/>
+          </p:nvPr>
+        </p:nvSpPr>
+        <p:spPr/>
+        <p:txBody>
+          <a:bodyPr/>
+          <a:lstStyle/>
+          <a:p>
+            <a:r>
+              <a:rPr lang="en-US" dirty="0" smtClean="0"/>
+              <a:t>Stopping criterion for partitioning</a:t>
+            </a:r>
+          </a:p>
+          <a:p>
+            <a:endParaRPr lang="en-US" dirty="0"/>
+          </a:p>
+        </p:txBody>
+      </p:sp>
+      <p:graphicFrame>
+        <p:nvGraphicFramePr>
+          <p:cNvPr id="216066" name="Object 2"/>
+          <p:cNvGraphicFramePr>
+            <a:graphicFrameLocks noChangeAspect="1"/>
+          </p:cNvGraphicFramePr>
+          <p:nvPr/>
+        </p:nvGraphicFramePr>
+        <p:xfrm>
+          <a:off x="975360" y="3810000"/>
+          <a:ext cx="7863840" cy="1026994"/>
+        </p:xfrm>
+        <a:graphic>
+          <a:graphicData uri="http://schemas.openxmlformats.org/presentationml/2006/ole">
+            <p:oleObj spid="_x0000_s216066" name="Microsoft Equation 3.0" r:id="rId3" imgW="3403440" imgH="444240" progId="Equation.3">
+              <p:embed/>
+            </p:oleObj>
+          </a:graphicData>
+        </a:graphic>
+      </p:graphicFrame>
+      <p:grpSp>
+        <p:nvGrpSpPr>
+          <p:cNvPr id="5" name="Group 30"/>
+          <p:cNvGrpSpPr/>
+          <p:nvPr/>
+        </p:nvGrpSpPr>
+        <p:grpSpPr>
+          <a:xfrm>
+            <a:off x="457200" y="2819400"/>
+            <a:ext cx="2438400" cy="1371600"/>
+            <a:chOff x="7162800" y="1447800"/>
+            <a:chExt cx="2438400" cy="1371600"/>
+          </a:xfrm>
+        </p:grpSpPr>
+        <p:sp>
+          <p:nvSpPr>
+            <p:cNvPr id="6" name="TextBox 5"/>
+            <p:cNvSpPr txBox="1"/>
+            <p:nvPr/>
+          </p:nvSpPr>
+          <p:spPr>
+            <a:xfrm>
+              <a:off x="7162800" y="1447800"/>
+              <a:ext cx="2286000" cy="830997"/>
+            </a:xfrm>
+            <a:prstGeom prst="rect">
+              <a:avLst/>
+            </a:prstGeom>
+          </p:spPr>
+          <p:style>
+            <a:lnRef idx="1">
+              <a:schemeClr val="accent1"/>
+            </a:lnRef>
+            <a:fillRef idx="2">
+              <a:schemeClr val="accent1"/>
+            </a:fillRef>
+            <a:effectRef idx="1">
+              <a:schemeClr val="accent1"/>
+            </a:effectRef>
+            <a:fontRef idx="minor">
+              <a:schemeClr val="dk1"/>
+            </a:fontRef>
+          </p:style>
+          <p:txBody>
+            <a:bodyPr wrap="square" rtlCol="0">
+              <a:spAutoFit/>
+            </a:bodyPr>
+            <a:lstStyle/>
+            <a:p>
+              <a:pPr algn="ctr"/>
+              <a:r>
+                <a:rPr lang="en-US" sz="2400" b="1" dirty="0" smtClean="0"/>
+                <a:t>1</a:t>
+              </a:r>
+              <a:r>
+                <a:rPr lang="en-US" sz="2400" i="1" baseline="-25000" dirty="0" smtClean="0"/>
+                <a:t>v,u </a:t>
+              </a:r>
+              <a:r>
+                <a:rPr lang="en-US" sz="2400" dirty="0" smtClean="0"/>
+                <a:t>= 1 if there is an edge </a:t>
+              </a:r>
+              <a:r>
+                <a:rPr lang="en-US" sz="2400" i="1" dirty="0" smtClean="0"/>
+                <a:t>v</a:t>
+              </a:r>
+              <a:r>
+                <a:rPr lang="en-US" sz="2400" dirty="0" smtClean="0"/>
+                <a:t>, </a:t>
+              </a:r>
+              <a:r>
+                <a:rPr lang="en-US" sz="2400" i="1" dirty="0" smtClean="0"/>
+                <a:t>u</a:t>
+              </a:r>
+              <a:endParaRPr lang="en-US" sz="2400" baseline="-25000" dirty="0"/>
+            </a:p>
+          </p:txBody>
+        </p:sp>
+        <p:cxnSp>
+          <p:nvCxnSpPr>
+            <p:cNvPr id="7" name="Straight Connector 6"/>
+            <p:cNvCxnSpPr/>
+            <p:nvPr/>
+          </p:nvCxnSpPr>
+          <p:spPr>
+            <a:xfrm rot="16200000" flipV="1">
+              <a:off x="9258300" y="2476500"/>
+              <a:ext cx="533400" cy="152400"/>
+            </a:xfrm>
+            <a:prstGeom prst="line">
+              <a:avLst/>
+            </a:prstGeom>
+            <a:ln w="28575"/>
+          </p:spPr>
+          <p:style>
+            <a:lnRef idx="1">
+              <a:schemeClr val="accent1"/>
+            </a:lnRef>
+            <a:fillRef idx="0">
+              <a:schemeClr val="accent1"/>
+            </a:fillRef>
+            <a:effectRef idx="0">
+              <a:schemeClr val="accent1"/>
+            </a:effectRef>
+            <a:fontRef idx="minor">
+              <a:schemeClr val="tx1"/>
+            </a:fontRef>
+          </p:style>
+        </p:cxnSp>
+      </p:grpSp>
+      <p:grpSp>
+        <p:nvGrpSpPr>
+          <p:cNvPr id="11" name="Group 30"/>
+          <p:cNvGrpSpPr/>
+          <p:nvPr/>
+        </p:nvGrpSpPr>
+        <p:grpSpPr>
+          <a:xfrm>
+            <a:off x="6400800" y="2514600"/>
+            <a:ext cx="2438400" cy="1600200"/>
+            <a:chOff x="7696200" y="1447800"/>
+            <a:chExt cx="2438400" cy="1600200"/>
+          </a:xfrm>
+        </p:grpSpPr>
+        <p:sp>
+          <p:nvSpPr>
+            <p:cNvPr id="12" name="TextBox 11"/>
+            <p:cNvSpPr txBox="1"/>
+            <p:nvPr/>
+          </p:nvSpPr>
+          <p:spPr>
+            <a:xfrm>
+              <a:off x="7696200" y="1447800"/>
+              <a:ext cx="2438400" cy="1200329"/>
+            </a:xfrm>
+            <a:prstGeom prst="rect">
+              <a:avLst/>
+            </a:prstGeom>
+          </p:spPr>
+          <p:style>
+            <a:lnRef idx="1">
+              <a:schemeClr val="accent1"/>
+            </a:lnRef>
+            <a:fillRef idx="2">
+              <a:schemeClr val="accent1"/>
+            </a:fillRef>
+            <a:effectRef idx="1">
+              <a:schemeClr val="accent1"/>
+            </a:effectRef>
+            <a:fontRef idx="minor">
+              <a:schemeClr val="dk1"/>
+            </a:fontRef>
+          </p:style>
+          <p:txBody>
+            <a:bodyPr wrap="square" rtlCol="0">
+              <a:spAutoFit/>
+            </a:bodyPr>
+            <a:lstStyle/>
+            <a:p>
+              <a:pPr algn="ctr"/>
+              <a:r>
+                <a:rPr lang="en-US" sz="2400" dirty="0" smtClean="0"/>
+                <a:t>the communities that </a:t>
+              </a:r>
+              <a:r>
+                <a:rPr lang="en-US" sz="2400" i="1" dirty="0" smtClean="0"/>
+                <a:t>v</a:t>
+              </a:r>
+              <a:r>
+                <a:rPr lang="en-US" sz="2400" dirty="0" smtClean="0"/>
+                <a:t> and </a:t>
+              </a:r>
+              <a:r>
+                <a:rPr lang="en-US" sz="2400" i="1" dirty="0" smtClean="0"/>
+                <a:t>u</a:t>
+              </a:r>
+              <a:r>
+                <a:rPr lang="en-US" sz="2400" dirty="0" smtClean="0"/>
+                <a:t> are assigned to</a:t>
+              </a:r>
+              <a:endParaRPr lang="en-US" sz="2400" baseline="-25000" dirty="0"/>
+            </a:p>
+          </p:txBody>
+        </p:sp>
+        <p:cxnSp>
+          <p:nvCxnSpPr>
+            <p:cNvPr id="13" name="Straight Connector 12"/>
+            <p:cNvCxnSpPr/>
+            <p:nvPr/>
+          </p:nvCxnSpPr>
+          <p:spPr>
+            <a:xfrm flipV="1">
+              <a:off x="8001000" y="2667000"/>
+              <a:ext cx="533400" cy="381000"/>
+            </a:xfrm>
+            <a:prstGeom prst="line">
+              <a:avLst/>
+            </a:prstGeom>
+            <a:ln w="28575"/>
+          </p:spPr>
+          <p:style>
+            <a:lnRef idx="1">
+              <a:schemeClr val="accent1"/>
+            </a:lnRef>
+            <a:fillRef idx="0">
+              <a:schemeClr val="accent1"/>
+            </a:fillRef>
+            <a:effectRef idx="0">
+              <a:schemeClr val="accent1"/>
+            </a:effectRef>
+            <a:fontRef idx="minor">
+              <a:schemeClr val="tx1"/>
+            </a:fontRef>
+          </p:style>
+        </p:cxnSp>
+        <p:cxnSp>
+          <p:nvCxnSpPr>
+            <p:cNvPr id="17" name="Straight Connector 16"/>
+            <p:cNvCxnSpPr/>
+            <p:nvPr/>
+          </p:nvCxnSpPr>
+          <p:spPr>
+            <a:xfrm rot="16200000" flipV="1">
+              <a:off x="8953500" y="2781300"/>
+              <a:ext cx="381000" cy="152400"/>
+            </a:xfrm>
+            <a:prstGeom prst="line">
+              <a:avLst/>
+            </a:prstGeom>
+            <a:ln w="28575"/>
+          </p:spPr>
+          <p:style>
+            <a:lnRef idx="1">
+              <a:schemeClr val="accent1"/>
+            </a:lnRef>
+            <a:fillRef idx="0">
+              <a:schemeClr val="accent1"/>
+            </a:fillRef>
+            <a:effectRef idx="0">
+              <a:schemeClr val="accent1"/>
+            </a:effectRef>
+            <a:fontRef idx="minor">
+              <a:schemeClr val="tx1"/>
+            </a:fontRef>
+          </p:style>
+        </p:cxnSp>
+      </p:grpSp>
+      <p:grpSp>
+        <p:nvGrpSpPr>
+          <p:cNvPr id="14" name="Group 30"/>
+          <p:cNvGrpSpPr/>
+          <p:nvPr/>
+        </p:nvGrpSpPr>
+        <p:grpSpPr>
+          <a:xfrm>
+            <a:off x="4495800" y="4724400"/>
+            <a:ext cx="1828800" cy="1440597"/>
+            <a:chOff x="7239000" y="838200"/>
+            <a:chExt cx="1828800" cy="1440597"/>
+          </a:xfrm>
+        </p:grpSpPr>
+        <p:sp>
+          <p:nvSpPr>
+            <p:cNvPr id="15" name="TextBox 14"/>
+            <p:cNvSpPr txBox="1"/>
+            <p:nvPr/>
+          </p:nvSpPr>
+          <p:spPr>
+            <a:xfrm>
+              <a:off x="7239000" y="1447800"/>
+              <a:ext cx="1828800" cy="830997"/>
+            </a:xfrm>
+            <a:prstGeom prst="rect">
+              <a:avLst/>
+            </a:prstGeom>
+          </p:spPr>
+          <p:style>
+            <a:lnRef idx="1">
+              <a:schemeClr val="accent1"/>
+            </a:lnRef>
+            <a:fillRef idx="2">
+              <a:schemeClr val="accent1"/>
+            </a:fillRef>
+            <a:effectRef idx="1">
+              <a:schemeClr val="accent1"/>
+            </a:effectRef>
+            <a:fontRef idx="minor">
+              <a:schemeClr val="dk1"/>
+            </a:fontRef>
+          </p:style>
+          <p:txBody>
+            <a:bodyPr wrap="square" rtlCol="0">
+              <a:spAutoFit/>
+            </a:bodyPr>
+            <a:lstStyle/>
+            <a:p>
+              <a:pPr algn="ctr"/>
+              <a:r>
+                <a:rPr lang="en-US" sz="2400" dirty="0" smtClean="0"/>
+                <a:t>divide over all edges </a:t>
+              </a:r>
+              <a:r>
+                <a:rPr lang="en-US" sz="2400" i="1" dirty="0" smtClean="0"/>
+                <a:t>m</a:t>
+              </a:r>
+              <a:endParaRPr lang="en-US" sz="2400" baseline="-25000" dirty="0"/>
+            </a:p>
+          </p:txBody>
+        </p:sp>
+        <p:cxnSp>
+          <p:nvCxnSpPr>
+            <p:cNvPr id="16" name="Straight Connector 15"/>
+            <p:cNvCxnSpPr>
+              <a:endCxn id="15" idx="0"/>
+            </p:cNvCxnSpPr>
+            <p:nvPr/>
+          </p:nvCxnSpPr>
+          <p:spPr>
+            <a:xfrm>
+              <a:off x="7391400" y="838200"/>
+              <a:ext cx="762000" cy="609600"/>
+            </a:xfrm>
+            <a:prstGeom prst="line">
+              <a:avLst/>
+            </a:prstGeom>
+            <a:ln w="28575"/>
+          </p:spPr>
+          <p:style>
+            <a:lnRef idx="1">
+              <a:schemeClr val="accent1"/>
+            </a:lnRef>
+            <a:fillRef idx="0">
+              <a:schemeClr val="accent1"/>
+            </a:fillRef>
+            <a:effectRef idx="0">
+              <a:schemeClr val="accent1"/>
+            </a:effectRef>
+            <a:fontRef idx="minor">
+              <a:schemeClr val="tx1"/>
+            </a:fontRef>
+          </p:style>
+        </p:cxnSp>
+      </p:grpSp>
+      <p:grpSp>
+        <p:nvGrpSpPr>
+          <p:cNvPr id="28" name="Group 49"/>
+          <p:cNvGrpSpPr/>
+          <p:nvPr/>
+        </p:nvGrpSpPr>
+        <p:grpSpPr>
+          <a:xfrm>
+            <a:off x="2819400" y="2209800"/>
+            <a:ext cx="3352800" cy="1577033"/>
+            <a:chOff x="5187461" y="5664200"/>
+            <a:chExt cx="3739661" cy="1577033"/>
+          </a:xfrm>
+        </p:grpSpPr>
+        <p:sp>
+          <p:nvSpPr>
+            <p:cNvPr id="29" name="Left Brace 28"/>
+            <p:cNvSpPr/>
+            <p:nvPr/>
+          </p:nvSpPr>
+          <p:spPr>
+            <a:xfrm rot="5400000">
+              <a:off x="6800850" y="5964883"/>
+              <a:ext cx="342900" cy="2209800"/>
+            </a:xfrm>
+            <a:prstGeom prst="leftBrace">
+              <a:avLst>
+                <a:gd name="adj1" fmla="val 44154"/>
+                <a:gd name="adj2" fmla="val 50000"/>
+              </a:avLst>
+            </a:prstGeom>
+            <a:ln w="28575">
+              <a:solidFill>
+                <a:schemeClr val="accent3"/>
+              </a:solidFill>
+            </a:ln>
+          </p:spPr>
+          <p:style>
+            <a:lnRef idx="1">
+              <a:schemeClr val="accent1"/>
+            </a:lnRef>
+            <a:fillRef idx="0">
+              <a:schemeClr val="accent1"/>
+            </a:fillRef>
+            <a:effectRef idx="0">
+              <a:schemeClr val="accent1"/>
+            </a:effectRef>
+            <a:fontRef idx="minor">
+              <a:schemeClr val="tx1"/>
+            </a:fontRef>
+          </p:style>
+          <p:txBody>
+            <a:bodyPr rtlCol="0" anchor="ctr"/>
+            <a:lstStyle/>
+            <a:p>
+              <a:pPr algn="ctr"/>
+              <a:endParaRPr lang="en-US"/>
+            </a:p>
+          </p:txBody>
+        </p:sp>
+        <p:sp>
+          <p:nvSpPr>
+            <p:cNvPr id="30" name="TextBox 29"/>
+            <p:cNvSpPr txBox="1"/>
+            <p:nvPr/>
+          </p:nvSpPr>
+          <p:spPr>
+            <a:xfrm>
+              <a:off x="5187461" y="5664200"/>
+              <a:ext cx="3739661" cy="1200329"/>
+            </a:xfrm>
+            <a:prstGeom prst="rect">
+              <a:avLst/>
+            </a:prstGeom>
+            <a:noFill/>
+          </p:spPr>
+          <p:txBody>
+            <a:bodyPr wrap="square" rtlCol="0">
+              <a:spAutoFit/>
+            </a:bodyPr>
+            <a:lstStyle/>
+            <a:p>
+              <a:pPr algn="ctr"/>
+              <a:r>
+                <a:rPr lang="en-US" sz="2400" dirty="0" smtClean="0">
+                  <a:solidFill>
+                    <a:schemeClr val="accent3">
+                      <a:lumMod val="75000"/>
+                    </a:schemeClr>
+                  </a:solidFill>
+                </a:rPr>
+                <a:t>Expected random edges (</a:t>
+              </a:r>
+              <a:r>
+                <a:rPr lang="en-US" sz="2400" b="1" dirty="0" smtClean="0">
+                  <a:solidFill>
+                    <a:schemeClr val="accent3">
+                      <a:lumMod val="75000"/>
+                    </a:schemeClr>
+                  </a:solidFill>
+                </a:rPr>
+                <a:t>Configuration model</a:t>
+              </a:r>
+              <a:r>
+                <a:rPr lang="en-US" sz="2400" dirty="0" smtClean="0">
+                  <a:solidFill>
+                    <a:schemeClr val="accent3">
+                      <a:lumMod val="75000"/>
+                    </a:schemeClr>
+                  </a:solidFill>
+                </a:rPr>
+                <a:t>) within a community</a:t>
+              </a:r>
+              <a:endParaRPr lang="en-US" sz="2400" dirty="0">
+                <a:solidFill>
+                  <a:schemeClr val="accent3">
+                    <a:lumMod val="75000"/>
+                  </a:schemeClr>
+                </a:solidFill>
+              </a:endParaRPr>
+            </a:p>
+          </p:txBody>
+        </p:sp>
+      </p:grpSp>
+      <p:grpSp>
+        <p:nvGrpSpPr>
+          <p:cNvPr id="31" name="Group 43"/>
+          <p:cNvGrpSpPr/>
+          <p:nvPr/>
+        </p:nvGrpSpPr>
+        <p:grpSpPr>
+          <a:xfrm>
+            <a:off x="2133600" y="4648200"/>
+            <a:ext cx="2209800" cy="1276529"/>
+            <a:chOff x="4776534" y="6324601"/>
+            <a:chExt cx="2849475" cy="1276529"/>
+          </a:xfrm>
+        </p:grpSpPr>
+        <p:sp>
+          <p:nvSpPr>
+            <p:cNvPr id="32" name="Left Brace 31"/>
+            <p:cNvSpPr/>
+            <p:nvPr/>
+          </p:nvSpPr>
+          <p:spPr>
+            <a:xfrm rot="16200000">
+              <a:off x="5781170" y="6106031"/>
+              <a:ext cx="152399" cy="589539"/>
+            </a:xfrm>
+            <a:prstGeom prst="leftBrace">
+              <a:avLst>
+                <a:gd name="adj1" fmla="val 44154"/>
+                <a:gd name="adj2" fmla="val 50000"/>
+              </a:avLst>
+            </a:prstGeom>
+            <a:ln w="28575">
+              <a:solidFill>
+                <a:schemeClr val="accent3"/>
+              </a:solidFill>
+            </a:ln>
+          </p:spPr>
+          <p:style>
+            <a:lnRef idx="1">
+              <a:schemeClr val="accent1"/>
+            </a:lnRef>
+            <a:fillRef idx="0">
+              <a:schemeClr val="accent1"/>
+            </a:fillRef>
+            <a:effectRef idx="0">
+              <a:schemeClr val="accent1"/>
+            </a:effectRef>
+            <a:fontRef idx="minor">
+              <a:schemeClr val="tx1"/>
+            </a:fontRef>
+          </p:style>
+          <p:txBody>
+            <a:bodyPr rtlCol="0" anchor="ctr"/>
+            <a:lstStyle/>
+            <a:p>
+              <a:pPr algn="ctr"/>
+              <a:endParaRPr lang="en-US"/>
+            </a:p>
+          </p:txBody>
+        </p:sp>
+        <p:sp>
+          <p:nvSpPr>
+            <p:cNvPr id="33" name="TextBox 32"/>
+            <p:cNvSpPr txBox="1"/>
+            <p:nvPr/>
+          </p:nvSpPr>
+          <p:spPr>
+            <a:xfrm>
+              <a:off x="4776534" y="6400801"/>
+              <a:ext cx="2849475" cy="1200329"/>
+            </a:xfrm>
+            <a:prstGeom prst="rect">
+              <a:avLst/>
+            </a:prstGeom>
+            <a:noFill/>
+          </p:spPr>
+          <p:txBody>
+            <a:bodyPr wrap="square" rtlCol="0">
+              <a:spAutoFit/>
+            </a:bodyPr>
+            <a:lstStyle/>
+            <a:p>
+              <a:pPr algn="ctr"/>
+              <a:r>
+                <a:rPr lang="en-US" sz="2400" dirty="0" smtClean="0">
+                  <a:solidFill>
+                    <a:schemeClr val="accent3">
+                      <a:lumMod val="75000"/>
+                    </a:schemeClr>
+                  </a:solidFill>
+                </a:rPr>
+                <a:t>count edges within a community</a:t>
+              </a:r>
+              <a:endParaRPr lang="en-US" sz="2400" i="1" dirty="0">
+                <a:solidFill>
+                  <a:schemeClr val="accent3">
+                    <a:lumMod val="75000"/>
+                  </a:schemeClr>
+                </a:solidFill>
+              </a:endParaRPr>
+            </a:p>
+          </p:txBody>
+        </p:sp>
+      </p:grpSp>
+      <p:grpSp>
+        <p:nvGrpSpPr>
+          <p:cNvPr id="37" name="Group 30"/>
+          <p:cNvGrpSpPr/>
+          <p:nvPr/>
+        </p:nvGrpSpPr>
+        <p:grpSpPr>
+          <a:xfrm>
+            <a:off x="5867400" y="4495800"/>
+            <a:ext cx="2133600" cy="537865"/>
+            <a:chOff x="8305800" y="1143000"/>
+            <a:chExt cx="2133600" cy="537865"/>
+          </a:xfrm>
+        </p:grpSpPr>
+        <p:sp>
+          <p:nvSpPr>
+            <p:cNvPr id="38" name="TextBox 37"/>
+            <p:cNvSpPr txBox="1"/>
+            <p:nvPr/>
+          </p:nvSpPr>
+          <p:spPr>
+            <a:xfrm>
+              <a:off x="8763000" y="1219200"/>
+              <a:ext cx="1676400" cy="461665"/>
+            </a:xfrm>
+            <a:prstGeom prst="rect">
+              <a:avLst/>
+            </a:prstGeom>
+          </p:spPr>
+          <p:style>
+            <a:lnRef idx="1">
+              <a:schemeClr val="accent1"/>
+            </a:lnRef>
+            <a:fillRef idx="2">
+              <a:schemeClr val="accent1"/>
+            </a:fillRef>
+            <a:effectRef idx="1">
+              <a:schemeClr val="accent1"/>
+            </a:effectRef>
+            <a:fontRef idx="minor">
+              <a:schemeClr val="dk1"/>
+            </a:fontRef>
+          </p:style>
+          <p:txBody>
+            <a:bodyPr wrap="square" rtlCol="0">
+              <a:spAutoFit/>
+            </a:bodyPr>
+            <a:lstStyle/>
+            <a:p>
+              <a:pPr algn="ctr"/>
+              <a:r>
+                <a:rPr lang="en-US" sz="2400" dirty="0" smtClean="0"/>
+                <a:t>1 if equal</a:t>
+              </a:r>
+              <a:endParaRPr lang="en-US" sz="2400" baseline="-25000" dirty="0"/>
+            </a:p>
+          </p:txBody>
+        </p:sp>
+        <p:cxnSp>
+          <p:nvCxnSpPr>
+            <p:cNvPr id="39" name="Straight Connector 38"/>
+            <p:cNvCxnSpPr/>
+            <p:nvPr/>
+          </p:nvCxnSpPr>
+          <p:spPr>
+            <a:xfrm>
+              <a:off x="8305800" y="1143000"/>
+              <a:ext cx="457200" cy="304800"/>
+            </a:xfrm>
+            <a:prstGeom prst="line">
+              <a:avLst/>
+            </a:prstGeom>
+            <a:ln w="28575"/>
+          </p:spPr>
+          <p:style>
+            <a:lnRef idx="1">
+              <a:schemeClr val="accent1"/>
+            </a:lnRef>
+            <a:fillRef idx="0">
+              <a:schemeClr val="accent1"/>
+            </a:fillRef>
+            <a:effectRef idx="0">
+              <a:schemeClr val="accent1"/>
+            </a:effectRef>
+            <a:fontRef idx="minor">
+              <a:schemeClr val="tx1"/>
+            </a:fontRef>
+          </p:style>
+        </p:cxnSp>
+      </p:grpSp>
+    </p:spTree>
+  </p:cSld>
+  <p:clrMapOvr>
+    <a:masterClrMapping/>
+  </p:clrMapOvr>
+  <p:timing>
+    <p:tnLst>
+      <p:par>
+        <p:cTn id="1" dur="indefinite" restart="never" nodeType="tmRoot">
+          <p:childTnLst>
+            <p:seq concurrent="1" nextAc="seek">
+              <p:cTn id="2" dur="indefinite" nodeType="mainSeq">
+                <p:childTnLst>
+                  <p:par>
+                    <p:cTn id="3" fill="hold">
+                      <p:stCondLst>
+                        <p:cond delay="indefinite"/>
+                      </p:stCondLst>
+                      <p:childTnLst>
+                        <p:par>
+                          <p:cTn id="4" fill="hold">
+                            <p:stCondLst>
+                              <p:cond delay="0"/>
+                            </p:stCondLst>
+                            <p:childTnLst>
+                              <p:par>
+                                <p:cTn id="5" presetID="1" presetClass="entr" presetSubtype="0" fill="hold" nodeType="clickEffect">
+                                  <p:stCondLst>
+                                    <p:cond delay="0"/>
+                                  </p:stCondLst>
+                                  <p:childTnLst>
+                                    <p:set>
+                                      <p:cBhvr>
+                                        <p:cTn id="6" dur="1" fill="hold">
+                                          <p:stCondLst>
+                                            <p:cond delay="0"/>
+                                          </p:stCondLst>
+                                        </p:cTn>
+                                        <p:tgtEl>
+                                          <p:spTgt spid="31"/>
+                                        </p:tgtEl>
+                                        <p:attrNameLst>
+                                          <p:attrName>style.visibility</p:attrName>
+                                        </p:attrNameLst>
+                                      </p:cBhvr>
+                                      <p:to>
+                                        <p:strVal val="visible"/>
+                                      </p:to>
+                                    </p:set>
+                                  </p:childTnLst>
+                                </p:cTn>
+                              </p:par>
+                            </p:childTnLst>
+                          </p:cTn>
+                        </p:par>
+                      </p:childTnLst>
+                    </p:cTn>
+                  </p:par>
+                  <p:par>
+                    <p:cTn id="7" fill="hold">
+                      <p:stCondLst>
+                        <p:cond delay="indefinite"/>
+                      </p:stCondLst>
+                      <p:childTnLst>
+                        <p:par>
+                          <p:cTn id="8" fill="hold">
+                            <p:stCondLst>
+                              <p:cond delay="0"/>
+                            </p:stCondLst>
+                            <p:childTnLst>
+                              <p:par>
+                                <p:cTn id="9" presetID="1" presetClass="entr" presetSubtype="0" fill="hold" nodeType="clickEffect">
+                                  <p:stCondLst>
+                                    <p:cond delay="0"/>
+                                  </p:stCondLst>
+                                  <p:childTnLst>
+                                    <p:set>
+                                      <p:cBhvr>
+                                        <p:cTn id="10" dur="1" fill="hold">
+                                          <p:stCondLst>
+                                            <p:cond delay="0"/>
+                                          </p:stCondLst>
+                                        </p:cTn>
+                                        <p:tgtEl>
+                                          <p:spTgt spid="28"/>
+                                        </p:tgtEl>
+                                        <p:attrNameLst>
+                                          <p:attrName>style.visibility</p:attrName>
+                                        </p:attrNameLst>
+                                      </p:cBhvr>
+                                      <p:to>
+                                        <p:strVal val="visible"/>
+                                      </p:to>
+                                    </p:set>
+                                  </p:childTnLst>
+                                </p:cTn>
+                              </p:par>
+                            </p:childTnLst>
+                          </p:cTn>
+                        </p:par>
+                      </p:childTnLst>
+                    </p:cTn>
+                  </p:par>
+                  <p:par>
+                    <p:cTn id="11" fill="hold">
+                      <p:stCondLst>
+                        <p:cond delay="indefinite"/>
+                      </p:stCondLst>
+                      <p:childTnLst>
+                        <p:par>
+                          <p:cTn id="12" fill="hold">
+                            <p:stCondLst>
+                              <p:cond delay="0"/>
+                            </p:stCondLst>
+                            <p:childTnLst>
+                              <p:par>
+                                <p:cTn id="13" presetID="1" presetClass="entr" presetSubtype="0" fill="hold" nodeType="clickEffect">
+                                  <p:stCondLst>
+                                    <p:cond delay="0"/>
+                                  </p:stCondLst>
+                                  <p:childTnLst>
+                                    <p:set>
+                                      <p:cBhvr>
+                                        <p:cTn id="14" dur="1" fill="hold">
+                                          <p:stCondLst>
+                                            <p:cond delay="0"/>
+                                          </p:stCondLst>
+                                        </p:cTn>
+                                        <p:tgtEl>
+                                          <p:spTgt spid="5"/>
+                                        </p:tgtEl>
+                                        <p:attrNameLst>
+                                          <p:attrName>style.visibility</p:attrName>
+                                        </p:attrNameLst>
+                                      </p:cBhvr>
+                                      <p:to>
+                                        <p:strVal val="visible"/>
+                                      </p:to>
+                                    </p:set>
+                                  </p:childTnLst>
+                                </p:cTn>
+                              </p:par>
+                            </p:childTnLst>
+                          </p:cTn>
+                        </p:par>
+                      </p:childTnLst>
+                    </p:cTn>
+                  </p:par>
+                  <p:par>
+                    <p:cTn id="15" fill="hold">
+                      <p:stCondLst>
+                        <p:cond delay="indefinite"/>
+                      </p:stCondLst>
+                      <p:childTnLst>
+                        <p:par>
+                          <p:cTn id="16" fill="hold">
+                            <p:stCondLst>
+                              <p:cond delay="0"/>
+                            </p:stCondLst>
+                            <p:childTnLst>
+                              <p:par>
+                                <p:cTn id="17" presetID="1" presetClass="entr" presetSubtype="0" fill="hold" nodeType="clickEffect">
+                                  <p:stCondLst>
+                                    <p:cond delay="0"/>
+                                  </p:stCondLst>
+                                  <p:childTnLst>
+                                    <p:set>
+                                      <p:cBhvr>
+                                        <p:cTn id="18" dur="1" fill="hold">
+                                          <p:stCondLst>
+                                            <p:cond delay="0"/>
+                                          </p:stCondLst>
+                                        </p:cTn>
+                                        <p:tgtEl>
+                                          <p:spTgt spid="14"/>
+                                        </p:tgtEl>
+                                        <p:attrNameLst>
+                                          <p:attrName>style.visibility</p:attrName>
+                                        </p:attrNameLst>
+                                      </p:cBhvr>
+                                      <p:to>
+                                        <p:strVal val="visible"/>
+                                      </p:to>
+                                    </p:set>
+                                  </p:childTnLst>
+                                </p:cTn>
+                              </p:par>
+                            </p:childTnLst>
+                          </p:cTn>
+                        </p:par>
+                      </p:childTnLst>
+                    </p:cTn>
+                  </p:par>
+                  <p:par>
+                    <p:cTn id="19" fill="hold">
+                      <p:stCondLst>
+                        <p:cond delay="indefinite"/>
+                      </p:stCondLst>
+                      <p:childTnLst>
+                        <p:par>
+                          <p:cTn id="20" fill="hold">
+                            <p:stCondLst>
+                              <p:cond delay="0"/>
+                            </p:stCondLst>
+                            <p:childTnLst>
+                              <p:par>
+                                <p:cTn id="21" presetID="1" presetClass="entr" presetSubtype="0" fill="hold" nodeType="clickEffect">
+                                  <p:stCondLst>
+                                    <p:cond delay="0"/>
+                                  </p:stCondLst>
+                                  <p:childTnLst>
+                                    <p:set>
+                                      <p:cBhvr>
+                                        <p:cTn id="22" dur="1" fill="hold">
+                                          <p:stCondLst>
+                                            <p:cond delay="0"/>
+                                          </p:stCondLst>
+                                        </p:cTn>
+                                        <p:tgtEl>
+                                          <p:spTgt spid="11"/>
+                                        </p:tgtEl>
+                                        <p:attrNameLst>
+                                          <p:attrName>style.visibility</p:attrName>
+                                        </p:attrNameLst>
+                                      </p:cBhvr>
+                                      <p:to>
+                                        <p:strVal val="visible"/>
+                                      </p:to>
+                                    </p:set>
+                                  </p:childTnLst>
+                                </p:cTn>
+                              </p:par>
+                            </p:childTnLst>
+                          </p:cTn>
+                        </p:par>
+                      </p:childTnLst>
+                    </p:cTn>
+                  </p:par>
+                  <p:par>
+                    <p:cTn id="23" fill="hold">
+                      <p:stCondLst>
+                        <p:cond delay="indefinite"/>
+                      </p:stCondLst>
+                      <p:childTnLst>
+                        <p:par>
+                          <p:cTn id="24" fill="hold">
+                            <p:stCondLst>
+                              <p:cond delay="0"/>
+                            </p:stCondLst>
+                            <p:childTnLst>
+                              <p:par>
+                                <p:cTn id="25" presetID="1" presetClass="entr" presetSubtype="0" fill="hold" nodeType="clickEffect">
+                                  <p:stCondLst>
+                                    <p:cond delay="0"/>
+                                  </p:stCondLst>
+                                  <p:childTnLst>
+                                    <p:set>
+                                      <p:cBhvr>
+                                        <p:cTn id="26" dur="1" fill="hold">
+                                          <p:stCondLst>
+                                            <p:cond delay="0"/>
+                                          </p:stCondLst>
+                                        </p:cTn>
+                                        <p:tgtEl>
+                                          <p:spTgt spid="37"/>
+                                        </p:tgtEl>
+                                        <p:attrNameLst>
+                                          <p:attrName>style.visibility</p:attrName>
+                                        </p:attrNameLst>
+                                      </p:cBhvr>
+                                      <p:to>
+                                        <p:strVal val="visible"/>
+                                      </p:to>
+                                    </p:set>
+                                  </p:childTnLst>
+                                </p:cTn>
+                              </p:par>
+                            </p:childTnLst>
+                          </p:cTn>
+                        </p:par>
+                      </p:childTnLst>
+                    </p:cTn>
+                  </p:par>
+                </p:childTnLst>
+              </p:cTn>
+              <p:prevCondLst>
+                <p:cond evt="onPrev" delay="0">
+                  <p:tgtEl>
+                    <p:sldTgt/>
+                  </p:tgtEl>
+                </p:cond>
+              </p:prevCondLst>
+              <p:nextCondLst>
+                <p:cond evt="onNext" delay="0">
+                  <p:tgtEl>
+                    <p:sldTgt/>
+                  </p:tgtEl>
+                </p:cond>
+              </p:nextCondLst>
+            </p:seq>
+          </p:childTnLst>
+        </p:cTn>
+      </p:par>
+    </p:tnLst>
+  </p:timing>
+</p:sld>
+</file>
+
+<file path=ppt/slides/slide26.xml><?xml version="1.0" encoding="utf-8"?>
+<p:sld xmlns:a="http://schemas.openxmlformats.org/drawingml/2006/main" xmlns:r="http://schemas.openxmlformats.org/officeDocument/2006/relationships" xmlns:p="http://schemas.openxmlformats.org/presentationml/2006/main">
+  <p:cSld>
+    <p:spTree>
+      <p:nvGrpSpPr>
+        <p:cNvPr id="1" name=""/>
+        <p:cNvGrpSpPr/>
+        <p:nvPr/>
+      </p:nvGrpSpPr>
+      <p:grpSpPr>
+        <a:xfrm>
+          <a:off x="0" y="0"/>
+          <a:ext cx="0" cy="0"/>
+          <a:chOff x="0" y="0"/>
+          <a:chExt cx="0" cy="0"/>
+        </a:xfrm>
+      </p:grpSpPr>
+      <p:sp>
+        <p:nvSpPr>
+          <p:cNvPr id="2" name="Title 1"/>
+          <p:cNvSpPr>
+            <a:spLocks noGrp="1"/>
+          </p:cNvSpPr>
+          <p:nvPr>
+            <p:ph type="title"/>
+          </p:nvPr>
+        </p:nvSpPr>
+        <p:spPr/>
+        <p:txBody>
+          <a:bodyPr/>
+          <a:lstStyle/>
+          <a:p>
+            <a:r>
+              <a:rPr lang="en-US" dirty="0" smtClean="0"/>
+              <a:t>Modularity interpretation</a:t>
+            </a:r>
+            <a:endParaRPr lang="en-US" dirty="0"/>
+          </a:p>
+        </p:txBody>
+      </p:sp>
+      <p:sp>
+        <p:nvSpPr>
+          <p:cNvPr id="3" name="Content Placeholder 2"/>
+          <p:cNvSpPr>
+            <a:spLocks noGrp="1"/>
+          </p:cNvSpPr>
+          <p:nvPr>
+            <p:ph idx="1"/>
+          </p:nvPr>
+        </p:nvSpPr>
+        <p:spPr>
+          <a:xfrm>
+            <a:off x="457200" y="1600200"/>
+            <a:ext cx="8229600" cy="5257800"/>
+          </a:xfrm>
+        </p:spPr>
+        <p:txBody>
+          <a:bodyPr>
+            <a:normAutofit/>
+          </a:bodyPr>
+          <a:lstStyle/>
+          <a:p>
+            <a:r>
+              <a:rPr lang="en-US" dirty="0" smtClean="0"/>
+              <a:t>Values: [-0.5, 1.0]</a:t>
+            </a:r>
+          </a:p>
+          <a:p>
+            <a:pPr lvl="1">
+              <a:buNone/>
+            </a:pPr>
+            <a:r>
+              <a:rPr lang="en-US" dirty="0" smtClean="0"/>
+              <a:t>- (</a:t>
+            </a:r>
+            <a:r>
+              <a:rPr lang="en-US" dirty="0" err="1" smtClean="0"/>
+              <a:t>neg</a:t>
+            </a:r>
+            <a:r>
+              <a:rPr lang="en-US" dirty="0" smtClean="0"/>
+              <a:t>): communities cut across links more than random</a:t>
+            </a:r>
+          </a:p>
+          <a:p>
+            <a:pPr lvl="1">
+              <a:buNone/>
+            </a:pPr>
+            <a:r>
+              <a:rPr lang="en-US" dirty="0" smtClean="0"/>
+              <a:t>0: communities capture nothing</a:t>
+            </a:r>
+          </a:p>
+          <a:p>
+            <a:pPr lvl="1">
+              <a:buNone/>
+            </a:pPr>
+            <a:r>
+              <a:rPr lang="en-US" dirty="0" smtClean="0"/>
+              <a:t>+(pos): communities have more links than you’d expect at random</a:t>
+            </a:r>
+          </a:p>
+          <a:p>
+            <a:r>
+              <a:rPr lang="en-US" dirty="0" smtClean="0"/>
+              <a:t>Criterion: stop partitioning when modularity drops below threshold</a:t>
+            </a:r>
+          </a:p>
+          <a:p>
+            <a:endParaRPr lang="en-US" dirty="0"/>
+          </a:p>
+        </p:txBody>
+      </p:sp>
+    </p:spTree>
+  </p:cSld>
+  <p:clrMapOvr>
+    <a:masterClrMapping/>
+  </p:clrMapOvr>
+  <p:timing>
+    <p:tnLst>
+      <p:par>
+        <p:cTn id="1" dur="indefinite" restart="never" nodeType="tmRoot">
+          <p:childTnLst>
+            <p:seq concurrent="1" nextAc="seek">
+              <p:cTn id="2" dur="indefinite" nodeType="mainSeq">
+                <p:childTnLst>
+                  <p:par>
+                    <p:cTn id="3" fill="hold">
+                      <p:stCondLst>
+                        <p:cond delay="indefinite"/>
+                      </p:stCondLst>
+                      <p:childTnLst>
+                        <p:par>
+                          <p:cTn id="4" fill="hold">
+                            <p:stCondLst>
+                              <p:cond delay="0"/>
+                            </p:stCondLst>
+                            <p:childTnLst>
+                              <p:par>
+                                <p:cTn id="5" presetID="1" presetClass="entr" presetSubtype="0" fill="hold" grpId="0" nodeType="clickEffect">
+                                  <p:stCondLst>
+                                    <p:cond delay="0"/>
+                                  </p:stCondLst>
+                                  <p:childTnLst>
+                                    <p:set>
+                                      <p:cBhvr>
+                                        <p:cTn id="6" dur="1" fill="hold">
+                                          <p:stCondLst>
+                                            <p:cond delay="0"/>
+                                          </p:stCondLst>
+                                        </p:cTn>
+                                        <p:tgtEl>
+                                          <p:spTgt spid="3">
+                                            <p:txEl>
+                                              <p:pRg st="0" end="0"/>
+                                            </p:txEl>
+                                          </p:spTgt>
+                                        </p:tgtEl>
+                                        <p:attrNameLst>
+                                          <p:attrName>style.visibility</p:attrName>
+                                        </p:attrNameLst>
+                                      </p:cBhvr>
+                                      <p:to>
+                                        <p:strVal val="visible"/>
+                                      </p:to>
+                                    </p:set>
+                                  </p:childTnLst>
+                                </p:cTn>
+                              </p:par>
+                            </p:childTnLst>
+                          </p:cTn>
+                        </p:par>
+                      </p:childTnLst>
+                    </p:cTn>
+                  </p:par>
+                  <p:par>
+                    <p:cTn id="7" fill="hold">
+                      <p:stCondLst>
+                        <p:cond delay="indefinite"/>
+                      </p:stCondLst>
+                      <p:childTnLst>
+                        <p:par>
+                          <p:cTn id="8" fill="hold">
+                            <p:stCondLst>
+                              <p:cond delay="0"/>
+                            </p:stCondLst>
+                            <p:childTnLst>
+                              <p:par>
+                                <p:cTn id="9" presetID="1" presetClass="entr" presetSubtype="0" fill="hold" grpId="0" nodeType="clickEffect">
+                                  <p:stCondLst>
+                                    <p:cond delay="0"/>
+                                  </p:stCondLst>
+                                  <p:childTnLst>
+                                    <p:set>
+                                      <p:cBhvr>
+                                        <p:cTn id="10" dur="1" fill="hold">
+                                          <p:stCondLst>
+                                            <p:cond delay="0"/>
+                                          </p:stCondLst>
+                                        </p:cTn>
+                                        <p:tgtEl>
+                                          <p:spTgt spid="3">
+                                            <p:txEl>
+                                              <p:pRg st="1" end="1"/>
+                                            </p:txEl>
+                                          </p:spTgt>
+                                        </p:tgtEl>
+                                        <p:attrNameLst>
+                                          <p:attrName>style.visibility</p:attrName>
+                                        </p:attrNameLst>
+                                      </p:cBhvr>
+                                      <p:to>
+                                        <p:strVal val="visible"/>
+                                      </p:to>
+                                    </p:set>
+                                  </p:childTnLst>
+                                </p:cTn>
+                              </p:par>
+                            </p:childTnLst>
+                          </p:cTn>
+                        </p:par>
+                      </p:childTnLst>
+                    </p:cTn>
+                  </p:par>
+                  <p:par>
+                    <p:cTn id="11" fill="hold">
+                      <p:stCondLst>
+                        <p:cond delay="indefinite"/>
+                      </p:stCondLst>
+                      <p:childTnLst>
+                        <p:par>
+                          <p:cTn id="12" fill="hold">
+                            <p:stCondLst>
+                              <p:cond delay="0"/>
+                            </p:stCondLst>
+                            <p:childTnLst>
+                              <p:par>
+                                <p:cTn id="13" presetID="1" presetClass="entr" presetSubtype="0" fill="hold" grpId="0" nodeType="clickEffect">
+                                  <p:stCondLst>
+                                    <p:cond delay="0"/>
+                                  </p:stCondLst>
+                                  <p:childTnLst>
+                                    <p:set>
+                                      <p:cBhvr>
+                                        <p:cTn id="14" dur="1" fill="hold">
+                                          <p:stCondLst>
+                                            <p:cond delay="0"/>
+                                          </p:stCondLst>
+                                        </p:cTn>
+                                        <p:tgtEl>
+                                          <p:spTgt spid="3">
+                                            <p:txEl>
+                                              <p:pRg st="2" end="2"/>
+                                            </p:txEl>
+                                          </p:spTgt>
+                                        </p:tgtEl>
+                                        <p:attrNameLst>
+                                          <p:attrName>style.visibility</p:attrName>
+                                        </p:attrNameLst>
+                                      </p:cBhvr>
+                                      <p:to>
+                                        <p:strVal val="visible"/>
+                                      </p:to>
+                                    </p:set>
+                                  </p:childTnLst>
+                                </p:cTn>
+                              </p:par>
+                            </p:childTnLst>
+                          </p:cTn>
+                        </p:par>
+                      </p:childTnLst>
+                    </p:cTn>
+                  </p:par>
+                  <p:par>
+                    <p:cTn id="15" fill="hold">
+                      <p:stCondLst>
+                        <p:cond delay="indefinite"/>
+                      </p:stCondLst>
+                      <p:childTnLst>
+                        <p:par>
+                          <p:cTn id="16" fill="hold">
+                            <p:stCondLst>
+                              <p:cond delay="0"/>
+                            </p:stCondLst>
+                            <p:childTnLst>
+                              <p:par>
+                                <p:cTn id="17" presetID="1" presetClass="entr" presetSubtype="0" fill="hold" grpId="0" nodeType="clickEffect">
+                                  <p:stCondLst>
+                                    <p:cond delay="0"/>
+                                  </p:stCondLst>
+                                  <p:childTnLst>
+                                    <p:set>
+                                      <p:cBhvr>
+                                        <p:cTn id="18" dur="1" fill="hold">
+                                          <p:stCondLst>
+                                            <p:cond delay="0"/>
+                                          </p:stCondLst>
+                                        </p:cTn>
+                                        <p:tgtEl>
+                                          <p:spTgt spid="3">
+                                            <p:txEl>
+                                              <p:pRg st="3" end="3"/>
+                                            </p:txEl>
+                                          </p:spTgt>
+                                        </p:tgtEl>
+                                        <p:attrNameLst>
+                                          <p:attrName>style.visibility</p:attrName>
+                                        </p:attrNameLst>
+                                      </p:cBhvr>
+                                      <p:to>
+                                        <p:strVal val="visible"/>
+                                      </p:to>
+                                    </p:set>
+                                  </p:childTnLst>
+                                </p:cTn>
+                              </p:par>
+                            </p:childTnLst>
+                          </p:cTn>
+                        </p:par>
+                      </p:childTnLst>
+                    </p:cTn>
+                  </p:par>
+                  <p:par>
+                    <p:cTn id="19" fill="hold">
+                      <p:stCondLst>
+                        <p:cond delay="indefinite"/>
+                      </p:stCondLst>
+                      <p:childTnLst>
+                        <p:par>
+                          <p:cTn id="20" fill="hold">
+                            <p:stCondLst>
+                              <p:cond delay="0"/>
+                            </p:stCondLst>
+                            <p:childTnLst>
+                              <p:par>
+                                <p:cTn id="21" presetID="1" presetClass="entr" presetSubtype="0" fill="hold" grpId="0" nodeType="clickEffect">
+                                  <p:stCondLst>
+                                    <p:cond delay="0"/>
+                                  </p:stCondLst>
+                                  <p:childTnLst>
+                                    <p:set>
+                                      <p:cBhvr>
+                                        <p:cTn id="22" dur="1" fill="hold">
+                                          <p:stCondLst>
+                                            <p:cond delay="0"/>
+                                          </p:stCondLst>
+                                        </p:cTn>
+                                        <p:tgtEl>
+                                          <p:spTgt spid="3">
+                                            <p:txEl>
+                                              <p:pRg st="4" end="4"/>
+                                            </p:txEl>
+                                          </p:spTgt>
+                                        </p:tgtEl>
+                                        <p:attrNameLst>
+                                          <p:attrName>style.visibility</p:attrName>
+                                        </p:attrNameLst>
+                                      </p:cBhvr>
+                                      <p:to>
+                                        <p:strVal val="visible"/>
+                                      </p:to>
+                                    </p:set>
+                                  </p:childTnLst>
+                                </p:cTn>
+                              </p:par>
+                            </p:childTnLst>
+                          </p:cTn>
+                        </p:par>
+                      </p:childTnLst>
+                    </p:cTn>
+                  </p:par>
+                </p:childTnLst>
+              </p:cTn>
+              <p:prevCondLst>
+                <p:cond evt="onPrev" delay="0">
+                  <p:tgtEl>
+                    <p:sldTgt/>
+                  </p:tgtEl>
+                </p:cond>
+              </p:prevCondLst>
+              <p:nextCondLst>
+                <p:cond evt="onNext" delay="0">
+                  <p:tgtEl>
+                    <p:sldTgt/>
+                  </p:tgtEl>
+                </p:cond>
+              </p:nextCondLst>
+            </p:seq>
+          </p:childTnLst>
+        </p:cTn>
+      </p:par>
+    </p:tnLst>
+    <p:bldLst>
+      <p:bldP spid="3" grpId="0" uiExpand="1" build="p" bldLvl="2"/>
+    </p:bldLst>
+  </p:timing>
+</p:sld>
+</file>
+
+<file path=ppt/slides/slide27.xml><?xml version="1.0" encoding="utf-8"?>
+<p:sld xmlns:a="http://schemas.openxmlformats.org/drawingml/2006/main" xmlns:r="http://schemas.openxmlformats.org/officeDocument/2006/relationships" xmlns:p="http://schemas.openxmlformats.org/presentationml/2006/main">
+  <p:cSld>
+    <p:spTree>
+      <p:nvGrpSpPr>
+        <p:cNvPr id="1" name=""/>
+        <p:cNvGrpSpPr/>
+        <p:nvPr/>
+      </p:nvGrpSpPr>
+      <p:grpSpPr>
+        <a:xfrm>
+          <a:off x="0" y="0"/>
+          <a:ext cx="0" cy="0"/>
+          <a:chOff x="0" y="0"/>
+          <a:chExt cx="0" cy="0"/>
+        </a:xfrm>
+      </p:grpSpPr>
+      <p:sp>
+        <p:nvSpPr>
+          <p:cNvPr id="4" name="Title 3"/>
+          <p:cNvSpPr>
+            <a:spLocks noGrp="1"/>
+          </p:cNvSpPr>
+          <p:nvPr>
+            <p:ph type="title"/>
+          </p:nvPr>
+        </p:nvSpPr>
+        <p:spPr/>
+        <p:txBody>
+          <a:bodyPr/>
+          <a:lstStyle/>
+          <a:p>
+            <a:r>
+              <a:rPr lang="en-US" dirty="0" smtClean="0"/>
+              <a:t>Think-Pair-Share:</a:t>
+            </a:r>
+            <a:endParaRPr lang="en-US" dirty="0"/>
+          </a:p>
+        </p:txBody>
+      </p:sp>
+      <p:sp>
+        <p:nvSpPr>
+          <p:cNvPr id="5" name="Text Placeholder 4"/>
+          <p:cNvSpPr>
+            <a:spLocks noGrp="1"/>
+          </p:cNvSpPr>
+          <p:nvPr>
+            <p:ph type="body" idx="1"/>
+          </p:nvPr>
+        </p:nvSpPr>
+        <p:spPr>
+          <a:xfrm>
+            <a:off x="685800" y="2209800"/>
+            <a:ext cx="7772400" cy="2936188"/>
+          </a:xfrm>
+        </p:spPr>
+        <p:txBody>
+          <a:bodyPr/>
+          <a:lstStyle/>
+          <a:p>
+            <a:r>
+              <a:rPr lang="en-US" dirty="0" smtClean="0"/>
+              <a:t>Could you use a Poisson random network </a:t>
+            </a:r>
+            <a:r>
+              <a:rPr lang="en-US" dirty="0" smtClean="0"/>
+              <a:t>to </a:t>
+            </a:r>
+            <a:r>
+              <a:rPr lang="en-US" dirty="0" smtClean="0"/>
+              <a:t>calculate modularity?</a:t>
+            </a:r>
+          </a:p>
+          <a:p>
+            <a:r>
+              <a:rPr lang="en-US" dirty="0" smtClean="0"/>
+              <a:t> If so, how? If not, why not?</a:t>
+            </a:r>
+            <a:endParaRPr lang="en-US" dirty="0"/>
+          </a:p>
+        </p:txBody>
+      </p:sp>
+    </p:spTree>
+  </p:cSld>
+  <p:clrMapOvr>
+    <a:masterClrMapping/>
+  </p:clrMapOvr>
+  <p:timing>
+    <p:tnLst>
+      <p:par>
+        <p:cTn id="1" dur="indefinite" restart="never" nodeType="tmRoot"/>
+      </p:par>
+    </p:tnLst>
+  </p:timing>
+</p:sld>
+</file>
+
+<file path=ppt/slides/slide28.xml><?xml version="1.0" encoding="utf-8"?>
+<p:sld xmlns:a="http://schemas.openxmlformats.org/drawingml/2006/main" xmlns:r="http://schemas.openxmlformats.org/officeDocument/2006/relationships" xmlns:p="http://schemas.openxmlformats.org/presentationml/2006/main">
+  <p:cSld>
+    <p:spTree>
+      <p:nvGrpSpPr>
+        <p:cNvPr id="1" name=""/>
+        <p:cNvGrpSpPr/>
+        <p:nvPr/>
+      </p:nvGrpSpPr>
+      <p:grpSpPr>
+        <a:xfrm>
+          <a:off x="0" y="0"/>
+          <a:ext cx="0" cy="0"/>
+          <a:chOff x="0" y="0"/>
+          <a:chExt cx="0" cy="0"/>
+        </a:xfrm>
+      </p:grpSpPr>
+      <p:sp>
+        <p:nvSpPr>
           <p:cNvPr id="4" name="Title 3"/>
           <p:cNvSpPr>
             <a:spLocks noGrp="1"/>
@@ -16124,7 +17677,7 @@
 </p:sld>
 </file>
 
-<file path=ppt/slides/slide26.xml><?xml version="1.0" encoding="utf-8"?>
+<file path=ppt/slides/slide29.xml><?xml version="1.0" encoding="utf-8"?>
 <p:sld xmlns:a="http://schemas.openxmlformats.org/drawingml/2006/main" xmlns:r="http://schemas.openxmlformats.org/officeDocument/2006/relationships" xmlns:p="http://schemas.openxmlformats.org/presentationml/2006/main">
   <p:cSld>
     <p:spTree>
@@ -18324,6 +19877,51 @@
                       </p:childTnLst>
                     </p:cTn>
                   </p:par>
+                  <p:par>
+                    <p:cTn id="19" fill="hold">
+                      <p:stCondLst>
+                        <p:cond delay="indefinite"/>
+                      </p:stCondLst>
+                      <p:childTnLst>
+                        <p:par>
+                          <p:cTn id="20" fill="hold">
+                            <p:stCondLst>
+                              <p:cond delay="0"/>
+                            </p:stCondLst>
+                            <p:childTnLst>
+                              <p:par>
+                                <p:cTn id="21" presetID="1" presetClass="entr" presetSubtype="0" fill="hold" grpId="0" nodeType="clickEffect">
+                                  <p:stCondLst>
+                                    <p:cond delay="0"/>
+                                  </p:stCondLst>
+                                  <p:childTnLst>
+                                    <p:set>
+                                      <p:cBhvr>
+                                        <p:cTn id="22" dur="1" fill="hold">
+                                          <p:stCondLst>
+                                            <p:cond delay="0"/>
+                                          </p:stCondLst>
+                                        </p:cTn>
+                                        <p:tgtEl>
+                                          <p:spTgt spid="74"/>
+                                        </p:tgtEl>
+                                        <p:attrNameLst>
+                                          <p:attrName>style.visibility</p:attrName>
+                                        </p:attrNameLst>
+                                      </p:cBhvr>
+                                      <p:to>
+                                        <p:strVal val="visible"/>
+                                      </p:to>
+                                    </p:set>
+                                  </p:childTnLst>
+                                </p:cTn>
+                              </p:par>
+                            </p:childTnLst>
+                          </p:cTn>
+                        </p:par>
+                      </p:childTnLst>
+                    </p:cTn>
+                  </p:par>
                 </p:childTnLst>
               </p:cTn>
               <p:prevCondLst>
@@ -18350,172 +19948,8 @@
       <p:bldP spid="71" grpId="0" animBg="1"/>
       <p:bldP spid="72" grpId="0" animBg="1"/>
       <p:bldP spid="73" grpId="0" animBg="1"/>
+      <p:bldP spid="74" grpId="0" animBg="1"/>
     </p:bldLst>
-  </p:timing>
-</p:sld>
-</file>
-
-<file path=ppt/slides/slide27.xml><?xml version="1.0" encoding="utf-8"?>
-<p:sld xmlns:a="http://schemas.openxmlformats.org/drawingml/2006/main" xmlns:r="http://schemas.openxmlformats.org/officeDocument/2006/relationships" xmlns:p="http://schemas.openxmlformats.org/presentationml/2006/main">
-  <p:cSld>
-    <p:spTree>
-      <p:nvGrpSpPr>
-        <p:cNvPr id="1" name=""/>
-        <p:cNvGrpSpPr/>
-        <p:nvPr/>
-      </p:nvGrpSpPr>
-      <p:grpSpPr>
-        <a:xfrm>
-          <a:off x="0" y="0"/>
-          <a:ext cx="0" cy="0"/>
-          <a:chOff x="0" y="0"/>
-          <a:chExt cx="0" cy="0"/>
-        </a:xfrm>
-      </p:grpSpPr>
-      <p:sp>
-        <p:nvSpPr>
-          <p:cNvPr id="4" name="Title 3"/>
-          <p:cNvSpPr>
-            <a:spLocks noGrp="1"/>
-          </p:cNvSpPr>
-          <p:nvPr>
-            <p:ph type="title"/>
-          </p:nvPr>
-        </p:nvSpPr>
-        <p:spPr/>
-        <p:txBody>
-          <a:bodyPr>
-            <a:normAutofit/>
-          </a:bodyPr>
-          <a:lstStyle/>
-          <a:p>
-            <a:r>
-              <a:rPr lang="en-US" dirty="0" smtClean="0"/>
-              <a:t>Announcements</a:t>
-            </a:r>
-            <a:endParaRPr lang="en-US" dirty="0"/>
-          </a:p>
-        </p:txBody>
-      </p:sp>
-      <p:sp>
-        <p:nvSpPr>
-          <p:cNvPr id="5" name="Content Placeholder 4"/>
-          <p:cNvSpPr>
-            <a:spLocks noGrp="1"/>
-          </p:cNvSpPr>
-          <p:nvPr>
-            <p:ph idx="1"/>
-          </p:nvPr>
-        </p:nvSpPr>
-        <p:spPr>
-          <a:xfrm>
-            <a:off x="457200" y="1600200"/>
-            <a:ext cx="8229600" cy="5257800"/>
-          </a:xfrm>
-        </p:spPr>
-        <p:txBody>
-          <a:bodyPr>
-            <a:normAutofit fontScale="85000" lnSpcReduction="20000"/>
-          </a:bodyPr>
-          <a:lstStyle/>
-          <a:p>
-            <a:pPr marL="742950" indent="-742950">
-              <a:buFont typeface="+mj-lt"/>
-              <a:buAutoNum type="arabicPeriod"/>
-            </a:pPr>
-            <a:r>
-              <a:rPr lang="en-US" b="1" dirty="0" smtClean="0"/>
-              <a:t>Assignment 2 being graded</a:t>
-            </a:r>
-            <a:r>
-              <a:rPr lang="en-US" dirty="0" smtClean="0"/>
-              <a:t>: Grades for Assignment 2 are not ready. Please see me if you haven’t gotten Assignment 0 or 1 grades.</a:t>
-            </a:r>
-          </a:p>
-          <a:p>
-            <a:pPr marL="742950" indent="-742950">
-              <a:buFont typeface="+mj-lt"/>
-              <a:buAutoNum type="arabicPeriod"/>
-            </a:pPr>
-            <a:r>
-              <a:rPr lang="en-US" b="1" dirty="0" smtClean="0"/>
-              <a:t>Midterm</a:t>
-            </a:r>
-            <a:r>
-              <a:rPr lang="en-US" dirty="0" smtClean="0"/>
-              <a:t>: Remember there will be a midterm Mon 23</a:t>
-            </a:r>
-            <a:r>
-              <a:rPr lang="en-US" baseline="30000" dirty="0" smtClean="0"/>
-              <a:t>rd</a:t>
-            </a:r>
-            <a:r>
-              <a:rPr lang="en-US" dirty="0" smtClean="0"/>
-              <a:t> April @ 8:00am.</a:t>
-            </a:r>
-          </a:p>
-          <a:p>
-            <a:pPr marL="742950" indent="-742950">
-              <a:buFont typeface="+mj-lt"/>
-              <a:buAutoNum type="arabicPeriod"/>
-            </a:pPr>
-            <a:r>
-              <a:rPr lang="en-US" b="1" dirty="0" smtClean="0"/>
-              <a:t>Assignment 3</a:t>
-            </a:r>
-            <a:r>
-              <a:rPr lang="en-US" dirty="0" smtClean="0"/>
-              <a:t>: Remember </a:t>
-            </a:r>
-            <a:r>
-              <a:rPr lang="en-US" b="1" dirty="0" smtClean="0">
-                <a:solidFill>
-                  <a:srgbClr val="FF0000"/>
-                </a:solidFill>
-              </a:rPr>
-              <a:t>Assignment 3 is due</a:t>
-            </a:r>
-            <a:r>
-              <a:rPr lang="en-US" dirty="0" smtClean="0"/>
-              <a:t> Thu 26</a:t>
-            </a:r>
-            <a:r>
-              <a:rPr lang="en-US" baseline="30000" dirty="0" smtClean="0"/>
-              <a:t>th</a:t>
-            </a:r>
-            <a:r>
-              <a:rPr lang="en-US" dirty="0" smtClean="0"/>
-              <a:t> April @ 8:30am.</a:t>
-            </a:r>
-            <a:endParaRPr lang="en-US" b="1" dirty="0" smtClean="0"/>
-          </a:p>
-          <a:p>
-            <a:pPr marL="742950" indent="-742950">
-              <a:buFont typeface="+mj-lt"/>
-              <a:buAutoNum type="arabicPeriod"/>
-            </a:pPr>
-            <a:r>
-              <a:rPr lang="en-US" b="1" dirty="0" smtClean="0"/>
-              <a:t>New Lecture Schedule</a:t>
-            </a:r>
-            <a:r>
-              <a:rPr lang="en-US" dirty="0" smtClean="0"/>
-              <a:t>: Mon @ 8:00am, starting today.</a:t>
-            </a:r>
-          </a:p>
-        </p:txBody>
-      </p:sp>
-    </p:spTree>
-  </p:cSld>
-  <p:clrMapOvr>
-    <a:masterClrMapping/>
-  </p:clrMapOvr>
-  <p:timing>
-    <p:tnLst>
-      <p:par>
-        <p:cTn id="1" dur="indefinite" restart="never" nodeType="tmRoot"/>
-      </p:par>
-    </p:tnLst>
   </p:timing>
 </p:sld>
 </file>
@@ -18595,6 +20029,171 @@
     <a:masterClrMapping/>
   </p:clrMapOvr>
   <p:transition/>
+  <p:timing>
+    <p:tnLst>
+      <p:par>
+        <p:cTn id="1" dur="indefinite" restart="never" nodeType="tmRoot"/>
+      </p:par>
+    </p:tnLst>
+  </p:timing>
+</p:sld>
+</file>
+
+<file path=ppt/slides/slide30.xml><?xml version="1.0" encoding="utf-8"?>
+<p:sld xmlns:a="http://schemas.openxmlformats.org/drawingml/2006/main" xmlns:r="http://schemas.openxmlformats.org/officeDocument/2006/relationships" xmlns:p="http://schemas.openxmlformats.org/presentationml/2006/main">
+  <p:cSld>
+    <p:spTree>
+      <p:nvGrpSpPr>
+        <p:cNvPr id="1" name=""/>
+        <p:cNvGrpSpPr/>
+        <p:nvPr/>
+      </p:nvGrpSpPr>
+      <p:grpSpPr>
+        <a:xfrm>
+          <a:off x="0" y="0"/>
+          <a:ext cx="0" cy="0"/>
+          <a:chOff x="0" y="0"/>
+          <a:chExt cx="0" cy="0"/>
+        </a:xfrm>
+      </p:grpSpPr>
+      <p:sp>
+        <p:nvSpPr>
+          <p:cNvPr id="4" name="Title 3"/>
+          <p:cNvSpPr>
+            <a:spLocks noGrp="1"/>
+          </p:cNvSpPr>
+          <p:nvPr>
+            <p:ph type="title"/>
+          </p:nvPr>
+        </p:nvSpPr>
+        <p:spPr/>
+        <p:txBody>
+          <a:bodyPr>
+            <a:normAutofit/>
+          </a:bodyPr>
+          <a:lstStyle/>
+          <a:p>
+            <a:r>
+              <a:rPr lang="en-US" dirty="0" smtClean="0"/>
+              <a:t>Announcements</a:t>
+            </a:r>
+            <a:endParaRPr lang="en-US" dirty="0"/>
+          </a:p>
+        </p:txBody>
+      </p:sp>
+      <p:sp>
+        <p:nvSpPr>
+          <p:cNvPr id="5" name="Content Placeholder 4"/>
+          <p:cNvSpPr>
+            <a:spLocks noGrp="1"/>
+          </p:cNvSpPr>
+          <p:nvPr>
+            <p:ph idx="1"/>
+          </p:nvPr>
+        </p:nvSpPr>
+        <p:spPr>
+          <a:xfrm>
+            <a:off x="457200" y="1600200"/>
+            <a:ext cx="8229600" cy="5257800"/>
+          </a:xfrm>
+        </p:spPr>
+        <p:txBody>
+          <a:bodyPr>
+            <a:normAutofit fontScale="85000" lnSpcReduction="20000"/>
+          </a:bodyPr>
+          <a:lstStyle/>
+          <a:p>
+            <a:pPr marL="742950" indent="-742950">
+              <a:buFont typeface="+mj-lt"/>
+              <a:buAutoNum type="arabicPeriod"/>
+            </a:pPr>
+            <a:r>
+              <a:rPr lang="en-US" b="1" dirty="0" smtClean="0"/>
+              <a:t>Assignment 2 being graded</a:t>
+            </a:r>
+            <a:r>
+              <a:rPr lang="en-US" dirty="0" smtClean="0"/>
+              <a:t>: Grades for Assignment 2 are not ready. Please see me if you haven’t gotten Assignment 0 or 1 grades.</a:t>
+            </a:r>
+          </a:p>
+          <a:p>
+            <a:pPr marL="742950" indent="-742950">
+              <a:buFont typeface="+mj-lt"/>
+              <a:buAutoNum type="arabicPeriod"/>
+            </a:pPr>
+            <a:r>
+              <a:rPr lang="en-US" b="1" dirty="0" smtClean="0"/>
+              <a:t>Midterm</a:t>
+            </a:r>
+            <a:r>
+              <a:rPr lang="en-US" dirty="0" smtClean="0"/>
+              <a:t>: Remember there will be a midterm Mon 23</a:t>
+            </a:r>
+            <a:r>
+              <a:rPr lang="en-US" baseline="30000" dirty="0" smtClean="0"/>
+              <a:t>rd</a:t>
+            </a:r>
+            <a:r>
+              <a:rPr lang="en-US" dirty="0" smtClean="0"/>
+              <a:t> April @ 8:00am.</a:t>
+            </a:r>
+          </a:p>
+          <a:p>
+            <a:pPr marL="742950" indent="-742950">
+              <a:buFont typeface="+mj-lt"/>
+              <a:buAutoNum type="arabicPeriod"/>
+            </a:pPr>
+            <a:r>
+              <a:rPr lang="en-US" b="1" dirty="0" smtClean="0"/>
+              <a:t>Assignment 3</a:t>
+            </a:r>
+            <a:r>
+              <a:rPr lang="en-US" dirty="0" smtClean="0"/>
+              <a:t>: Remember </a:t>
+            </a:r>
+            <a:r>
+              <a:rPr lang="en-US" b="1" dirty="0" smtClean="0">
+                <a:solidFill>
+                  <a:srgbClr val="FF0000"/>
+                </a:solidFill>
+              </a:rPr>
+              <a:t>Assignment 3 is due</a:t>
+            </a:r>
+            <a:r>
+              <a:rPr lang="en-US" dirty="0" smtClean="0"/>
+              <a:t> Thu 26</a:t>
+            </a:r>
+            <a:r>
+              <a:rPr lang="en-US" baseline="30000" dirty="0" smtClean="0"/>
+              <a:t>th</a:t>
+            </a:r>
+            <a:r>
+              <a:rPr lang="en-US" dirty="0" smtClean="0"/>
+              <a:t> April @ 8:30am.</a:t>
+            </a:r>
+            <a:endParaRPr lang="en-US" b="1" dirty="0" smtClean="0"/>
+          </a:p>
+          <a:p>
+            <a:pPr marL="742950" indent="-742950">
+              <a:buFont typeface="+mj-lt"/>
+              <a:buAutoNum type="arabicPeriod"/>
+            </a:pPr>
+            <a:r>
+              <a:rPr lang="en-US" b="1" dirty="0" smtClean="0"/>
+              <a:t>New Lecture Schedule</a:t>
+            </a:r>
+            <a:r>
+              <a:rPr lang="en-US" dirty="0" smtClean="0"/>
+              <a:t>: Mon @ 8:00am, starting today.</a:t>
+            </a:r>
+          </a:p>
+        </p:txBody>
+      </p:sp>
+    </p:spTree>
+  </p:cSld>
+  <p:clrMapOvr>
+    <a:masterClrMapping/>
+  </p:clrMapOvr>
   <p:timing>
     <p:tnLst>
       <p:par>

</xml_diff>